<commit_message>
Finished notebook ->>>>> CHANGE TODO in the end
</commit_message>
<xml_diff>
--- a/Assigment2/docs/Checkpoint1_trabalho2.pptx
+++ b/Assigment2/docs/Checkpoint1_trabalho2.pptx
@@ -262,8 +262,11 @@
     </a:lvl9pPr>
   </p:defaultTextStyle>
   <p:extLst>
+    <p:ext uri="{EFAFB233-063F-42B5-8137-9DF3F51BA10A}">
+      <p15:sldGuideLst xmlns:p15="http://schemas.microsoft.com/office/powerpoint/2012/main"/>
+    </p:ext>
     <p:ext uri="http://customooxmlschemas.google.com/">
-      <go:slidesCustomData xmlns:go="http://customooxmlschemas.google.com/" xmlns:p15="http://schemas.microsoft.com/office/powerpoint/2012/main" xmlns:p14="http://schemas.microsoft.com/office/powerpoint/2010/main" xmlns:com="http://schemas.openxmlformats.org/drawingml/2006/compatibility" xmlns:pvml="urn:schemas-microsoft-com:office:powerpoint" xmlns:v="urn:schemas-microsoft-com:vml" xmlns:o="urn:schemas-microsoft-com:office:office" xmlns:dgm="http://schemas.openxmlformats.org/drawingml/2006/diagram" xmlns:c="http://schemas.openxmlformats.org/drawingml/2006/chart" xmlns:mv="urn:schemas-microsoft-com:mac:vml" xmlns:mc="http://schemas.openxmlformats.org/markup-compatibility/2006" xmlns="" r:id="rId19" roundtripDataSignature="AMtx7mifcsTMsixaGb0bd/GHsZ37z9E/mg=="/>
+      <go:slidesCustomData xmlns="" xmlns:mc="http://schemas.openxmlformats.org/markup-compatibility/2006" xmlns:mv="urn:schemas-microsoft-com:mac:vml" xmlns:c="http://schemas.openxmlformats.org/drawingml/2006/chart" xmlns:dgm="http://schemas.openxmlformats.org/drawingml/2006/diagram" xmlns:o="urn:schemas-microsoft-com:office:office" xmlns:v="urn:schemas-microsoft-com:vml" xmlns:pvml="urn:schemas-microsoft-com:office:powerpoint" xmlns:com="http://schemas.openxmlformats.org/drawingml/2006/compatibility" xmlns:p14="http://schemas.microsoft.com/office/powerpoint/2010/main" xmlns:p15="http://schemas.microsoft.com/office/powerpoint/2012/main" xmlns:go="http://customooxmlschemas.google.com/" r:id="rId19" roundtripDataSignature="AMtx7mifcsTMsixaGb0bd/GHsZ37z9E/mg=="/>
     </p:ext>
   </p:extLst>
 </p:presentation>
@@ -881,8 +884,8 @@
         </p:nvSpPr>
         <p:spPr>
           <a:xfrm>
-            <a:off x="1260175" y="801875"/>
-            <a:ext cx="5040025" cy="4009425"/>
+            <a:off x="217488" y="801688"/>
+            <a:ext cx="7126287" cy="4010025"/>
           </a:xfrm>
           <a:custGeom>
             <a:avLst/>
@@ -15132,7 +15135,7 @@
               <a:buNone/>
             </a:pPr>
             <a:r>
-              <a:rPr lang="pt-PT" b="1">
+              <a:rPr lang="pt-PT" b="1" dirty="0">
                 <a:solidFill>
                   <a:schemeClr val="dk1"/>
                 </a:solidFill>
@@ -15144,7 +15147,7 @@
               <a:t>Ambiente de desenvolvimento:</a:t>
             </a:r>
             <a:r>
-              <a:rPr lang="pt-PT">
+              <a:rPr lang="pt-PT" dirty="0">
                 <a:solidFill>
                   <a:schemeClr val="dk1"/>
                 </a:solidFill>
@@ -15153,9 +15156,33 @@
                 <a:cs typeface="Libre Franklin"/>
                 <a:sym typeface="Libre Franklin"/>
               </a:rPr>
-              <a:t> Jupyter Notebook</a:t>
+              <a:t> </a:t>
             </a:r>
-            <a:endParaRPr>
+            <a:r>
+              <a:rPr lang="pt-PT" dirty="0" err="1">
+                <a:solidFill>
+                  <a:schemeClr val="dk1"/>
+                </a:solidFill>
+                <a:latin typeface="Libre Franklin"/>
+                <a:ea typeface="Libre Franklin"/>
+                <a:cs typeface="Libre Franklin"/>
+                <a:sym typeface="Libre Franklin"/>
+              </a:rPr>
+              <a:t>Jupyter</a:t>
+            </a:r>
+            <a:r>
+              <a:rPr lang="pt-PT" dirty="0">
+                <a:solidFill>
+                  <a:schemeClr val="dk1"/>
+                </a:solidFill>
+                <a:latin typeface="Libre Franklin"/>
+                <a:ea typeface="Libre Franklin"/>
+                <a:cs typeface="Libre Franklin"/>
+                <a:sym typeface="Libre Franklin"/>
+              </a:rPr>
+              <a:t> Notebook</a:t>
+            </a:r>
+            <a:endParaRPr dirty="0">
               <a:solidFill>
                 <a:schemeClr val="dk1"/>
               </a:solidFill>
@@ -15184,7 +15211,7 @@
               <a:buNone/>
             </a:pPr>
             <a:r>
-              <a:rPr lang="pt-PT" b="1">
+              <a:rPr lang="pt-PT" b="1" dirty="0">
                 <a:solidFill>
                   <a:schemeClr val="dk1"/>
                 </a:solidFill>
@@ -15196,7 +15223,7 @@
               <a:t>Bibliotecas</a:t>
             </a:r>
             <a:r>
-              <a:rPr lang="pt-PT">
+              <a:rPr lang="pt-PT" dirty="0">
                 <a:solidFill>
                   <a:schemeClr val="dk1"/>
                 </a:solidFill>
@@ -15205,9 +15232,129 @@
                 <a:cs typeface="Libre Franklin"/>
                 <a:sym typeface="Libre Franklin"/>
               </a:rPr>
-              <a:t>: pandas e sqlite3 (extração dos dados); numpy e scipy (manipulação dos dados); seaborn e matplotlib.pyplot (visualização);  scikit-learn (modelos de aprendizagem).</a:t>
+              <a:t>: pandas e sqlite3 (extração dos dados); </a:t>
             </a:r>
-            <a:endParaRPr>
+            <a:r>
+              <a:rPr lang="pt-PT" dirty="0" err="1">
+                <a:solidFill>
+                  <a:schemeClr val="dk1"/>
+                </a:solidFill>
+                <a:latin typeface="Libre Franklin"/>
+                <a:ea typeface="Libre Franklin"/>
+                <a:cs typeface="Libre Franklin"/>
+                <a:sym typeface="Libre Franklin"/>
+              </a:rPr>
+              <a:t>numpy</a:t>
+            </a:r>
+            <a:r>
+              <a:rPr lang="pt-PT" dirty="0">
+                <a:solidFill>
+                  <a:schemeClr val="dk1"/>
+                </a:solidFill>
+                <a:latin typeface="Libre Franklin"/>
+                <a:ea typeface="Libre Franklin"/>
+                <a:cs typeface="Libre Franklin"/>
+                <a:sym typeface="Libre Franklin"/>
+              </a:rPr>
+              <a:t> e </a:t>
+            </a:r>
+            <a:r>
+              <a:rPr lang="pt-PT" dirty="0" err="1">
+                <a:solidFill>
+                  <a:schemeClr val="dk1"/>
+                </a:solidFill>
+                <a:latin typeface="Libre Franklin"/>
+                <a:ea typeface="Libre Franklin"/>
+                <a:cs typeface="Libre Franklin"/>
+                <a:sym typeface="Libre Franklin"/>
+              </a:rPr>
+              <a:t>scipy</a:t>
+            </a:r>
+            <a:r>
+              <a:rPr lang="pt-PT" dirty="0">
+                <a:solidFill>
+                  <a:schemeClr val="dk1"/>
+                </a:solidFill>
+                <a:latin typeface="Libre Franklin"/>
+                <a:ea typeface="Libre Franklin"/>
+                <a:cs typeface="Libre Franklin"/>
+                <a:sym typeface="Libre Franklin"/>
+              </a:rPr>
+              <a:t> (manipulação dos dados); </a:t>
+            </a:r>
+            <a:r>
+              <a:rPr lang="pt-PT" dirty="0" err="1">
+                <a:solidFill>
+                  <a:schemeClr val="dk1"/>
+                </a:solidFill>
+                <a:latin typeface="Libre Franklin"/>
+                <a:ea typeface="Libre Franklin"/>
+                <a:cs typeface="Libre Franklin"/>
+                <a:sym typeface="Libre Franklin"/>
+              </a:rPr>
+              <a:t>seaborn</a:t>
+            </a:r>
+            <a:r>
+              <a:rPr lang="pt-PT" dirty="0">
+                <a:solidFill>
+                  <a:schemeClr val="dk1"/>
+                </a:solidFill>
+                <a:latin typeface="Libre Franklin"/>
+                <a:ea typeface="Libre Franklin"/>
+                <a:cs typeface="Libre Franklin"/>
+                <a:sym typeface="Libre Franklin"/>
+              </a:rPr>
+              <a:t> e </a:t>
+            </a:r>
+            <a:r>
+              <a:rPr lang="pt-PT" dirty="0" err="1">
+                <a:solidFill>
+                  <a:schemeClr val="dk1"/>
+                </a:solidFill>
+                <a:latin typeface="Libre Franklin"/>
+                <a:ea typeface="Libre Franklin"/>
+                <a:cs typeface="Libre Franklin"/>
+                <a:sym typeface="Libre Franklin"/>
+              </a:rPr>
+              <a:t>matplotlib.pyplot</a:t>
+            </a:r>
+            <a:r>
+              <a:rPr lang="pt-PT" dirty="0">
+                <a:solidFill>
+                  <a:schemeClr val="dk1"/>
+                </a:solidFill>
+                <a:latin typeface="Libre Franklin"/>
+                <a:ea typeface="Libre Franklin"/>
+                <a:cs typeface="Libre Franklin"/>
+                <a:sym typeface="Libre Franklin"/>
+              </a:rPr>
+              <a:t> (visualização);  </a:t>
+            </a:r>
+            <a:r>
+              <a:rPr lang="pt-PT" dirty="0" err="1">
+                <a:solidFill>
+                  <a:schemeClr val="dk1"/>
+                </a:solidFill>
+                <a:latin typeface="Libre Franklin"/>
+                <a:ea typeface="Libre Franklin"/>
+                <a:cs typeface="Libre Franklin"/>
+                <a:sym typeface="Libre Franklin"/>
+              </a:rPr>
+              <a:t>scikit-learn</a:t>
+            </a:r>
+            <a:r>
+              <a:rPr lang="pt-PT" dirty="0">
+                <a:solidFill>
+                  <a:schemeClr val="dk1"/>
+                </a:solidFill>
+                <a:latin typeface="Libre Franklin"/>
+                <a:ea typeface="Libre Franklin"/>
+                <a:cs typeface="Libre Franklin"/>
+                <a:sym typeface="Libre Franklin"/>
+              </a:rPr>
+              <a:t> (modelos de aprendizagem).</a:t>
+            </a:r>
+            <a:endParaRPr dirty="0">
               <a:solidFill>
                 <a:schemeClr val="dk1"/>
               </a:solidFill>
@@ -15236,7 +15383,7 @@
               <a:buNone/>
             </a:pPr>
             <a:r>
-              <a:rPr lang="pt-PT" b="1">
+              <a:rPr lang="pt-PT" b="1" dirty="0" err="1">
                 <a:solidFill>
                   <a:schemeClr val="dk1"/>
                 </a:solidFill>
@@ -15245,10 +15392,10 @@
                 <a:cs typeface="Libre Franklin"/>
                 <a:sym typeface="Libre Franklin"/>
               </a:rPr>
-              <a:t>Codigo desenvolvid:</a:t>
+              <a:t>Codigo</a:t>
             </a:r>
             <a:r>
-              <a:rPr lang="pt-PT">
+              <a:rPr lang="pt-PT" b="1" dirty="0">
                 <a:solidFill>
                   <a:schemeClr val="dk1"/>
                 </a:solidFill>
@@ -15260,7 +15407,43 @@
               <a:t> </a:t>
             </a:r>
             <a:r>
-              <a:rPr lang="pt-PT" u="sng">
+              <a:rPr lang="pt-PT" b="1" dirty="0" err="1">
+                <a:solidFill>
+                  <a:schemeClr val="dk1"/>
+                </a:solidFill>
+                <a:latin typeface="Libre Franklin"/>
+                <a:ea typeface="Libre Franklin"/>
+                <a:cs typeface="Libre Franklin"/>
+                <a:sym typeface="Libre Franklin"/>
+              </a:rPr>
+              <a:t>desenvolvid</a:t>
+            </a:r>
+            <a:r>
+              <a:rPr lang="pt-PT" b="1" dirty="0">
+                <a:solidFill>
+                  <a:schemeClr val="dk1"/>
+                </a:solidFill>
+                <a:latin typeface="Libre Franklin"/>
+                <a:ea typeface="Libre Franklin"/>
+                <a:cs typeface="Libre Franklin"/>
+                <a:sym typeface="Libre Franklin"/>
+              </a:rPr>
+              <a:t>:</a:t>
+            </a:r>
+            <a:r>
+              <a:rPr lang="pt-PT" dirty="0">
+                <a:solidFill>
+                  <a:schemeClr val="dk1"/>
+                </a:solidFill>
+                <a:latin typeface="Libre Franklin"/>
+                <a:ea typeface="Libre Franklin"/>
+                <a:cs typeface="Libre Franklin"/>
+                <a:sym typeface="Libre Franklin"/>
+              </a:rPr>
+              <a:t> </a:t>
+            </a:r>
+            <a:r>
+              <a:rPr lang="pt-PT" u="sng" dirty="0">
                 <a:solidFill>
                   <a:schemeClr val="hlink"/>
                 </a:solidFill>
@@ -15272,7 +15455,7 @@
               </a:rPr>
               <a:t>https://github.com/j-vm/FEUP_IART_2020/tree/master/Assigment2/data-analysis</a:t>
             </a:r>
-            <a:endParaRPr>
+            <a:endParaRPr dirty="0">
               <a:solidFill>
                 <a:schemeClr val="dk1"/>
               </a:solidFill>
@@ -15300,7 +15483,7 @@
               <a:buFont typeface="Arial"/>
               <a:buNone/>
             </a:pPr>
-            <a:endParaRPr>
+            <a:endParaRPr dirty="0">
               <a:solidFill>
                 <a:schemeClr val="dk1"/>
               </a:solidFill>
@@ -15329,7 +15512,7 @@
               <a:buNone/>
             </a:pPr>
             <a:r>
-              <a:rPr lang="pt-PT" sz="1500">
+              <a:rPr lang="pt-PT" sz="1500" dirty="0">
                 <a:solidFill>
                   <a:schemeClr val="dk1"/>
                 </a:solidFill>
@@ -15340,7 +15523,7 @@
               </a:rPr>
               <a:t> </a:t>
             </a:r>
-            <a:endParaRPr sz="1500">
+            <a:endParaRPr sz="1500" dirty="0">
               <a:solidFill>
                 <a:schemeClr val="dk1"/>
               </a:solidFill>
@@ -15363,7 +15546,7 @@
               </a:spcAft>
               <a:buNone/>
             </a:pPr>
-            <a:endParaRPr sz="1800" b="1">
+            <a:endParaRPr sz="1800" b="1" dirty="0">
               <a:latin typeface="Libre Franklin"/>
               <a:ea typeface="Libre Franklin"/>
               <a:cs typeface="Libre Franklin"/>
@@ -15439,7 +15622,7 @@
         <p:spPr>
           <a:xfrm>
             <a:off x="735400" y="6109700"/>
-            <a:ext cx="10770900" cy="579600"/>
+            <a:ext cx="10770900" cy="983336"/>
           </a:xfrm>
           <a:prstGeom prst="rect">
             <a:avLst/>
@@ -15468,7 +15651,7 @@
               <a:buNone/>
             </a:pPr>
             <a:r>
-              <a:rPr lang="pt-PT" sz="1100" u="sng">
+              <a:rPr lang="pt-PT" sz="1100" u="sng" dirty="0">
                 <a:solidFill>
                   <a:schemeClr val="hlink"/>
                 </a:solidFill>
@@ -15477,7 +15660,7 @@
               <a:t>https://www.kaggle.com/dimarudov/data-analysis-using-sql</a:t>
             </a:r>
             <a:r>
-              <a:rPr lang="pt-PT">
+              <a:rPr lang="pt-PT" dirty="0">
                 <a:solidFill>
                   <a:schemeClr val="dk1"/>
                 </a:solidFill>
@@ -15489,7 +15672,7 @@
               <a:t> | </a:t>
             </a:r>
             <a:r>
-              <a:rPr lang="pt-PT" sz="1100" u="sng">
+              <a:rPr lang="pt-PT" sz="1100" u="sng" dirty="0">
                 <a:solidFill>
                   <a:schemeClr val="hlink"/>
                 </a:solidFill>
@@ -15497,7 +15680,7 @@
               </a:rPr>
               <a:t>https://www.kaggle.com/airback/match-outcome-prediction-in-football</a:t>
             </a:r>
-            <a:endParaRPr>
+            <a:endParaRPr dirty="0">
               <a:solidFill>
                 <a:schemeClr val="dk1"/>
               </a:solidFill>
@@ -15521,7 +15704,7 @@
               <a:buNone/>
             </a:pPr>
             <a:r>
-              <a:rPr lang="pt-PT" sz="1100" u="sng">
+              <a:rPr lang="pt-PT" sz="1100" u="sng" dirty="0">
                 <a:solidFill>
                   <a:schemeClr val="hlink"/>
                 </a:solidFill>
@@ -15530,7 +15713,7 @@
               <a:t>https://scikit-learn.org/stable/auto_examples/index.html#</a:t>
             </a:r>
             <a:r>
-              <a:rPr lang="pt-PT">
+              <a:rPr lang="pt-PT" dirty="0">
                 <a:solidFill>
                   <a:schemeClr val="dk1"/>
                 </a:solidFill>
@@ -15542,7 +15725,7 @@
               <a:t> | </a:t>
             </a:r>
             <a:r>
-              <a:rPr lang="pt-PT" sz="1100" u="sng">
+              <a:rPr lang="pt-PT" sz="1100" u="sng" dirty="0">
                 <a:solidFill>
                   <a:schemeClr val="hlink"/>
                 </a:solidFill>
@@ -15550,7 +15733,7 @@
               </a:rPr>
               <a:t>https://github.com/justmarkham/scikit-learn-videos</a:t>
             </a:r>
-            <a:endParaRPr>
+            <a:endParaRPr dirty="0">
               <a:solidFill>
                 <a:schemeClr val="dk1"/>
               </a:solidFill>
@@ -15573,7 +15756,7 @@
               </a:spcAft>
               <a:buNone/>
             </a:pPr>
-            <a:endParaRPr>
+            <a:endParaRPr dirty="0">
               <a:solidFill>
                 <a:schemeClr val="dk1"/>
               </a:solidFill>
@@ -15596,7 +15779,7 @@
               </a:spcAft>
               <a:buNone/>
             </a:pPr>
-            <a:endParaRPr>
+            <a:endParaRPr dirty="0">
               <a:solidFill>
                 <a:schemeClr val="dk1"/>
               </a:solidFill>
@@ -15619,7 +15802,7 @@
               </a:spcAft>
               <a:buNone/>
             </a:pPr>
-            <a:endParaRPr>
+            <a:endParaRPr dirty="0">
               <a:solidFill>
                 <a:schemeClr val="dk1"/>
               </a:solidFill>

</xml_diff>